<commit_message>
missing point in presentation
</commit_message>
<xml_diff>
--- a/orga/SCC_TimeTracker_final_presentation.pptx
+++ b/orga/SCC_TimeTracker_final_presentation.pptx
@@ -7239,7 +7239,7 @@
           <a:p>
             <a:fld id="{7CE5BEBC-D66A-3D40-958A-78C6F7D28329}" type="datetimeFigureOut">
               <a:rPr lang="de-DE" smtClean="0"/>
-              <a:t>22.01.19</a:t>
+              <a:t>29.01.19</a:t>
             </a:fld>
             <a:endParaRPr lang="de-DE"/>
           </a:p>
@@ -7896,7 +7896,7 @@
           <a:p>
             <a:fld id="{F6F4C3C5-764B-B744-AF8A-FA81F43DC7F0}" type="datetime1">
               <a:rPr lang="de-DE" smtClean="0"/>
-              <a:t>22.01.19</a:t>
+              <a:t>29.01.19</a:t>
             </a:fld>
             <a:endParaRPr lang="en-GB"/>
           </a:p>
@@ -8074,7 +8074,7 @@
           <a:p>
             <a:fld id="{4BE354BD-6085-E840-9C4D-F86AAD7C8FE7}" type="datetime1">
               <a:rPr lang="de-DE" smtClean="0"/>
-              <a:t>22.01.19</a:t>
+              <a:t>29.01.19</a:t>
             </a:fld>
             <a:endParaRPr lang="en-GB"/>
           </a:p>
@@ -8262,7 +8262,7 @@
           <a:p>
             <a:fld id="{C95AF9F0-72A5-8C48-922A-BEE4FF7E257E}" type="datetime1">
               <a:rPr lang="de-DE" smtClean="0"/>
-              <a:t>22.01.19</a:t>
+              <a:t>29.01.19</a:t>
             </a:fld>
             <a:endParaRPr lang="en-GB"/>
           </a:p>
@@ -8440,7 +8440,7 @@
           <a:p>
             <a:fld id="{7F8D9695-AF90-6941-BE29-F53A2D77A903}" type="datetime1">
               <a:rPr lang="de-DE" smtClean="0"/>
-              <a:t>22.01.19</a:t>
+              <a:t>29.01.19</a:t>
             </a:fld>
             <a:endParaRPr lang="en-GB"/>
           </a:p>
@@ -8723,7 +8723,7 @@
           <a:p>
             <a:fld id="{DFAB2C26-5F58-E04E-B699-86D2EA1B83A7}" type="datetime1">
               <a:rPr lang="de-DE" smtClean="0"/>
-              <a:t>22.01.19</a:t>
+              <a:t>29.01.19</a:t>
             </a:fld>
             <a:endParaRPr lang="en-GB"/>
           </a:p>
@@ -8944,7 +8944,7 @@
           <a:p>
             <a:fld id="{ABC424DB-1E40-9C4B-84BE-CDF06229AA9E}" type="datetime1">
               <a:rPr lang="de-DE" smtClean="0"/>
-              <a:t>22.01.19</a:t>
+              <a:t>29.01.19</a:t>
             </a:fld>
             <a:endParaRPr lang="en-GB"/>
           </a:p>
@@ -9320,7 +9320,7 @@
           <a:p>
             <a:fld id="{5C7FBD36-A94A-8846-9DB4-221FF8B7EDF2}" type="datetime1">
               <a:rPr lang="de-DE" smtClean="0"/>
-              <a:t>22.01.19</a:t>
+              <a:t>29.01.19</a:t>
             </a:fld>
             <a:endParaRPr lang="en-GB"/>
           </a:p>
@@ -9465,7 +9465,7 @@
           <a:p>
             <a:fld id="{B873F7D2-0312-9445-8C05-81F380E2AAC3}" type="datetime1">
               <a:rPr lang="de-DE" smtClean="0"/>
-              <a:t>22.01.19</a:t>
+              <a:t>29.01.19</a:t>
             </a:fld>
             <a:endParaRPr lang="en-GB"/>
           </a:p>
@@ -9581,7 +9581,7 @@
           <a:p>
             <a:fld id="{7D6AC989-38C1-154C-88DA-083754726A07}" type="datetime1">
               <a:rPr lang="de-DE" smtClean="0"/>
-              <a:t>22.01.19</a:t>
+              <a:t>29.01.19</a:t>
             </a:fld>
             <a:endParaRPr lang="en-GB"/>
           </a:p>
@@ -9876,7 +9876,7 @@
           <a:p>
             <a:fld id="{50751A78-3AB4-1B42-B747-4E2F9FF2FD27}" type="datetime1">
               <a:rPr lang="de-DE" smtClean="0"/>
-              <a:t>22.01.19</a:t>
+              <a:t>29.01.19</a:t>
             </a:fld>
             <a:endParaRPr lang="en-GB"/>
           </a:p>
@@ -10172,7 +10172,7 @@
           <a:p>
             <a:fld id="{1D95FCBD-23F5-5B4A-8635-92B21388363B}" type="datetime1">
               <a:rPr lang="de-DE" smtClean="0"/>
-              <a:t>22.01.19</a:t>
+              <a:t>29.01.19</a:t>
             </a:fld>
             <a:endParaRPr lang="en-GB"/>
           </a:p>
@@ -10393,7 +10393,7 @@
           <a:p>
             <a:fld id="{6FF16F73-DC0C-C747-9C49-21FDFFA6D403}" type="datetime1">
               <a:rPr lang="de-DE" smtClean="0"/>
-              <a:t>22.01.19</a:t>
+              <a:t>29.01.19</a:t>
             </a:fld>
             <a:endParaRPr lang="en-GB"/>
           </a:p>
@@ -11097,25 +11097,30 @@
               <a:buNone/>
             </a:pPr>
             <a:r>
-              <a:rPr lang="de-DE"/>
+              <a:rPr lang="de-DE" dirty="0"/>
               <a:t>Nicht Erreicht wurde: </a:t>
             </a:r>
           </a:p>
           <a:p>
-            <a:endParaRPr lang="de-DE"/>
+            <a:endParaRPr lang="de-DE" dirty="0"/>
           </a:p>
           <a:p>
             <a:r>
-              <a:rPr lang="de-DE"/>
+              <a:rPr lang="de-DE" dirty="0"/>
               <a:t>App </a:t>
             </a:r>
           </a:p>
           <a:p>
             <a:r>
               <a:rPr lang="de-DE"/>
+              <a:t>Globale Statistiken </a:t>
+            </a:r>
+          </a:p>
+          <a:p>
+            <a:r>
+              <a:rPr lang="de-DE" dirty="0"/>
               <a:t>Grafiken für Statistik </a:t>
             </a:r>
-            <a:endParaRPr lang="de-DE" dirty="0"/>
           </a:p>
         </p:txBody>
       </p:sp>
@@ -11147,7 +11152,7 @@
           <a:p>
             <a:fld id="{7F8D9695-AF90-6941-BE29-F53A2D77A903}" type="datetime1">
               <a:rPr lang="de-DE" smtClean="0"/>
-              <a:t>22.01.19</a:t>
+              <a:t>29.01.19</a:t>
             </a:fld>
             <a:endParaRPr lang="en-GB" dirty="0"/>
           </a:p>
@@ -11308,7 +11313,7 @@
           <a:p>
             <a:fld id="{C925B9A5-2C26-AE4D-B87D-FDCB7672961E}" type="datetime1">
               <a:rPr lang="de-DE" smtClean="0"/>
-              <a:t>22.01.19</a:t>
+              <a:t>29.01.19</a:t>
             </a:fld>
             <a:endParaRPr lang="en-GB" dirty="0"/>
           </a:p>
@@ -11704,7 +11709,7 @@
           <a:p>
             <a:fld id="{7F8D9695-AF90-6941-BE29-F53A2D77A903}" type="datetime1">
               <a:rPr lang="de-DE" smtClean="0"/>
-              <a:t>22.01.19</a:t>
+              <a:t>29.01.19</a:t>
             </a:fld>
             <a:endParaRPr lang="en-GB"/>
           </a:p>
@@ -11888,7 +11893,7 @@
           <a:p>
             <a:fld id="{53F32209-A9A1-964E-AE7A-74B597182930}" type="datetime1">
               <a:rPr lang="de-DE" smtClean="0"/>
-              <a:t>22.01.19</a:t>
+              <a:t>29.01.19</a:t>
             </a:fld>
             <a:endParaRPr lang="en-GB"/>
           </a:p>
@@ -12546,7 +12551,7 @@
           <a:p>
             <a:fld id="{7F8D9695-AF90-6941-BE29-F53A2D77A903}" type="datetime1">
               <a:rPr lang="de-DE" smtClean="0"/>
-              <a:t>22.01.19</a:t>
+              <a:t>29.01.19</a:t>
             </a:fld>
             <a:endParaRPr lang="en-GB"/>
           </a:p>
@@ -13602,7 +13607,7 @@
           <a:p>
             <a:fld id="{44936624-53A9-854D-924F-19118245427A}" type="datetime1">
               <a:rPr lang="de-DE" smtClean="0"/>
-              <a:t>22.01.19</a:t>
+              <a:t>29.01.19</a:t>
             </a:fld>
             <a:endParaRPr lang="en-GB"/>
           </a:p>
@@ -13797,7 +13802,7 @@
           <a:p>
             <a:fld id="{44936624-53A9-854D-924F-19118245427A}" type="datetime1">
               <a:rPr lang="de-DE" smtClean="0"/>
-              <a:t>22.01.19</a:t>
+              <a:t>29.01.19</a:t>
             </a:fld>
             <a:endParaRPr lang="en-GB"/>
           </a:p>
@@ -14366,7 +14371,7 @@
           <a:p>
             <a:fld id="{ABC424DB-1E40-9C4B-84BE-CDF06229AA9E}" type="datetime1">
               <a:rPr lang="de-DE" smtClean="0"/>
-              <a:t>22.01.19</a:t>
+              <a:t>29.01.19</a:t>
             </a:fld>
             <a:endParaRPr lang="en-GB"/>
           </a:p>
@@ -14633,7 +14638,7 @@
           <a:p>
             <a:fld id="{7F8D9695-AF90-6941-BE29-F53A2D77A903}" type="datetime1">
               <a:rPr lang="de-DE" smtClean="0"/>
-              <a:t>22.01.19</a:t>
+              <a:t>29.01.19</a:t>
             </a:fld>
             <a:endParaRPr lang="en-GB" dirty="0"/>
           </a:p>

</xml_diff>